<commit_message>
Refactor file upload endpoint to always use /rmeta for metadata and content extraction; update HTML and JavaScript for improved result handling.
</commit_message>
<xml_diff>
--- a/Report_ApacheTika.pptx
+++ b/Report_ApacheTika.pptx
@@ -5212,7 +5212,7 @@
           <a:p>
             <a:fld id="{4AAAF045-FEF6-43EA-9CDC-C84FC3F85E9C}" type="datetimeFigureOut">
               <a:rPr lang="en-US" smtClean="0"/>
-              <a:t>09/06/2025</a:t>
+              <a:t>09/08/2025</a:t>
             </a:fld>
             <a:endParaRPr lang="en-US"/>
           </a:p>
@@ -5557,13 +5557,13 @@
   <p:clrMapOvr>
     <a:masterClrMapping/>
   </p:clrMapOvr>
-  <mc:AlternateContent xmlns:mc="http://schemas.openxmlformats.org/markup-compatibility/2006">
-    <mc:Choice xmlns:p14="http://schemas.microsoft.com/office/powerpoint/2010/main" Requires="p14">
+  <mc:AlternateContent xmlns:mc="http://schemas.openxmlformats.org/markup-compatibility/2006" xmlns:p14="http://schemas.microsoft.com/office/powerpoint/2010/main">
+    <mc:Choice Requires="p14">
       <p:transition spd="med" p14:dur="700">
         <p:fade/>
       </p:transition>
     </mc:Choice>
-    <mc:Fallback>
+    <mc:Fallback xmlns="">
       <p:transition spd="med">
         <p:fade/>
       </p:transition>
@@ -5613,13 +5613,13 @@
   <p:clrMapOvr>
     <a:masterClrMapping/>
   </p:clrMapOvr>
-  <mc:AlternateContent xmlns:mc="http://schemas.openxmlformats.org/markup-compatibility/2006">
-    <mc:Choice xmlns:p14="http://schemas.microsoft.com/office/powerpoint/2010/main" Requires="p14">
+  <mc:AlternateContent xmlns:mc="http://schemas.openxmlformats.org/markup-compatibility/2006" xmlns:p14="http://schemas.microsoft.com/office/powerpoint/2010/main">
+    <mc:Choice Requires="p14">
       <p:transition spd="med" p14:dur="700">
         <p:fade/>
       </p:transition>
     </mc:Choice>
-    <mc:Fallback>
+    <mc:Fallback xmlns="">
       <p:transition spd="med">
         <p:fade/>
       </p:transition>
@@ -6923,13 +6923,13 @@
   <p:clrMapOvr>
     <a:masterClrMapping/>
   </p:clrMapOvr>
-  <mc:AlternateContent xmlns:mc="http://schemas.openxmlformats.org/markup-compatibility/2006">
-    <mc:Choice xmlns:p14="http://schemas.microsoft.com/office/powerpoint/2010/main" Requires="p14">
+  <mc:AlternateContent xmlns:mc="http://schemas.openxmlformats.org/markup-compatibility/2006" xmlns:p14="http://schemas.microsoft.com/office/powerpoint/2010/main">
+    <mc:Choice Requires="p14">
       <p:transition spd="med" p14:dur="700">
         <p:fade/>
       </p:transition>
     </mc:Choice>
-    <mc:Fallback>
+    <mc:Fallback xmlns="">
       <p:transition spd="med">
         <p:fade/>
       </p:transition>
@@ -6979,13 +6979,13 @@
   <p:clrMapOvr>
     <a:masterClrMapping/>
   </p:clrMapOvr>
-  <mc:AlternateContent xmlns:mc="http://schemas.openxmlformats.org/markup-compatibility/2006">
-    <mc:Choice xmlns:p14="http://schemas.microsoft.com/office/powerpoint/2010/main" Requires="p14">
+  <mc:AlternateContent xmlns:mc="http://schemas.openxmlformats.org/markup-compatibility/2006" xmlns:p14="http://schemas.microsoft.com/office/powerpoint/2010/main">
+    <mc:Choice Requires="p14">
       <p:transition spd="med" p14:dur="700">
         <p:fade/>
       </p:transition>
     </mc:Choice>
-    <mc:Fallback>
+    <mc:Fallback xmlns="">
       <p:transition spd="med">
         <p:fade/>
       </p:transition>
@@ -7256,13 +7256,13 @@
   <p:clrMapOvr>
     <a:masterClrMapping/>
   </p:clrMapOvr>
-  <mc:AlternateContent xmlns:mc="http://schemas.openxmlformats.org/markup-compatibility/2006">
-    <mc:Choice xmlns:p14="http://schemas.microsoft.com/office/powerpoint/2010/main" Requires="p14">
+  <mc:AlternateContent xmlns:mc="http://schemas.openxmlformats.org/markup-compatibility/2006" xmlns:p14="http://schemas.microsoft.com/office/powerpoint/2010/main">
+    <mc:Choice Requires="p14">
       <p:transition spd="med" p14:dur="700">
         <p:fade/>
       </p:transition>
     </mc:Choice>
-    <mc:Fallback>
+    <mc:Fallback xmlns="">
       <p:transition spd="med">
         <p:fade/>
       </p:transition>
@@ -7312,13 +7312,13 @@
   <p:clrMapOvr>
     <a:masterClrMapping/>
   </p:clrMapOvr>
-  <mc:AlternateContent xmlns:mc="http://schemas.openxmlformats.org/markup-compatibility/2006">
-    <mc:Choice xmlns:p14="http://schemas.microsoft.com/office/powerpoint/2010/main" Requires="p14">
+  <mc:AlternateContent xmlns:mc="http://schemas.openxmlformats.org/markup-compatibility/2006" xmlns:p14="http://schemas.microsoft.com/office/powerpoint/2010/main">
+    <mc:Choice Requires="p14">
       <p:transition spd="med" p14:dur="700">
         <p:fade/>
       </p:transition>
     </mc:Choice>
-    <mc:Fallback>
+    <mc:Fallback xmlns="">
       <p:transition spd="med">
         <p:fade/>
       </p:transition>
@@ -9894,13 +9894,13 @@
   <p:clrMapOvr>
     <a:masterClrMapping/>
   </p:clrMapOvr>
-  <mc:AlternateContent xmlns:mc="http://schemas.openxmlformats.org/markup-compatibility/2006">
-    <mc:Choice xmlns:p14="http://schemas.microsoft.com/office/powerpoint/2010/main" Requires="p14">
+  <mc:AlternateContent xmlns:mc="http://schemas.openxmlformats.org/markup-compatibility/2006" xmlns:p14="http://schemas.microsoft.com/office/powerpoint/2010/main">
+    <mc:Choice Requires="p14">
       <p:transition spd="med" p14:dur="700">
         <p:fade/>
       </p:transition>
     </mc:Choice>
-    <mc:Fallback>
+    <mc:Fallback xmlns="">
       <p:transition spd="med">
         <p:fade/>
       </p:transition>
@@ -9950,13 +9950,13 @@
   <p:clrMapOvr>
     <a:masterClrMapping/>
   </p:clrMapOvr>
-  <mc:AlternateContent xmlns:mc="http://schemas.openxmlformats.org/markup-compatibility/2006">
-    <mc:Choice xmlns:p14="http://schemas.microsoft.com/office/powerpoint/2010/main" Requires="p14">
+  <mc:AlternateContent xmlns:mc="http://schemas.openxmlformats.org/markup-compatibility/2006" xmlns:p14="http://schemas.microsoft.com/office/powerpoint/2010/main">
+    <mc:Choice Requires="p14">
       <p:transition spd="med" p14:dur="700">
         <p:fade/>
       </p:transition>
     </mc:Choice>
-    <mc:Fallback>
+    <mc:Fallback xmlns="">
       <p:transition spd="med">
         <p:fade/>
       </p:transition>
@@ -10006,13 +10006,13 @@
   <p:clrMapOvr>
     <a:masterClrMapping/>
   </p:clrMapOvr>
-  <mc:AlternateContent xmlns:mc="http://schemas.openxmlformats.org/markup-compatibility/2006">
-    <mc:Choice xmlns:p14="http://schemas.microsoft.com/office/powerpoint/2010/main" Requires="p14">
+  <mc:AlternateContent xmlns:mc="http://schemas.openxmlformats.org/markup-compatibility/2006" xmlns:p14="http://schemas.microsoft.com/office/powerpoint/2010/main">
+    <mc:Choice Requires="p14">
       <p:transition spd="med" p14:dur="700">
         <p:fade/>
       </p:transition>
     </mc:Choice>
-    <mc:Fallback>
+    <mc:Fallback xmlns="">
       <p:transition spd="med">
         <p:fade/>
       </p:transition>
@@ -10107,13 +10107,13 @@
   <p:clrMapOvr>
     <a:masterClrMapping/>
   </p:clrMapOvr>
-  <mc:AlternateContent xmlns:mc="http://schemas.openxmlformats.org/markup-compatibility/2006">
-    <mc:Choice xmlns:p14="http://schemas.microsoft.com/office/powerpoint/2010/main" Requires="p14">
+  <mc:AlternateContent xmlns:mc="http://schemas.openxmlformats.org/markup-compatibility/2006" xmlns:p14="http://schemas.microsoft.com/office/powerpoint/2010/main">
+    <mc:Choice Requires="p14">
       <p:transition spd="med" p14:dur="700">
         <p:fade/>
       </p:transition>
     </mc:Choice>
-    <mc:Fallback>
+    <mc:Fallback xmlns="">
       <p:transition spd="med">
         <p:fade/>
       </p:transition>
@@ -10565,13 +10565,13 @@
   <p:clrMapOvr>
     <a:masterClrMapping/>
   </p:clrMapOvr>
-  <mc:AlternateContent xmlns:mc="http://schemas.openxmlformats.org/markup-compatibility/2006">
-    <mc:Choice xmlns:p14="http://schemas.microsoft.com/office/powerpoint/2010/main" Requires="p14">
+  <mc:AlternateContent xmlns:mc="http://schemas.openxmlformats.org/markup-compatibility/2006" xmlns:p14="http://schemas.microsoft.com/office/powerpoint/2010/main">
+    <mc:Choice Requires="p14">
       <p:transition spd="med" p14:dur="700">
         <p:fade/>
       </p:transition>
     </mc:Choice>
-    <mc:Fallback>
+    <mc:Fallback xmlns="">
       <p:transition spd="med">
         <p:fade/>
       </p:transition>
@@ -10607,13 +10607,13 @@
   <p:clrMapOvr>
     <a:masterClrMapping/>
   </p:clrMapOvr>
-  <mc:AlternateContent xmlns:mc="http://schemas.openxmlformats.org/markup-compatibility/2006">
-    <mc:Choice xmlns:p14="http://schemas.microsoft.com/office/powerpoint/2010/main" Requires="p14">
+  <mc:AlternateContent xmlns:mc="http://schemas.openxmlformats.org/markup-compatibility/2006" xmlns:p14="http://schemas.microsoft.com/office/powerpoint/2010/main">
+    <mc:Choice Requires="p14">
       <p:transition spd="med" p14:dur="700">
         <p:fade/>
       </p:transition>
     </mc:Choice>
-    <mc:Fallback>
+    <mc:Fallback xmlns="">
       <p:transition spd="med">
         <p:fade/>
       </p:transition>
@@ -10663,13 +10663,13 @@
   <p:clrMapOvr>
     <a:masterClrMapping/>
   </p:clrMapOvr>
-  <mc:AlternateContent xmlns:mc="http://schemas.openxmlformats.org/markup-compatibility/2006">
-    <mc:Choice xmlns:p14="http://schemas.microsoft.com/office/powerpoint/2010/main" Requires="p14">
+  <mc:AlternateContent xmlns:mc="http://schemas.openxmlformats.org/markup-compatibility/2006" xmlns:p14="http://schemas.microsoft.com/office/powerpoint/2010/main">
+    <mc:Choice Requires="p14">
       <p:transition spd="med" p14:dur="700">
         <p:fade/>
       </p:transition>
     </mc:Choice>
-    <mc:Fallback>
+    <mc:Fallback xmlns="">
       <p:transition spd="med">
         <p:fade/>
       </p:transition>
@@ -10719,13 +10719,13 @@
   <p:clrMapOvr>
     <a:masterClrMapping/>
   </p:clrMapOvr>
-  <mc:AlternateContent xmlns:mc="http://schemas.openxmlformats.org/markup-compatibility/2006">
-    <mc:Choice xmlns:p14="http://schemas.microsoft.com/office/powerpoint/2010/main" Requires="p14">
+  <mc:AlternateContent xmlns:mc="http://schemas.openxmlformats.org/markup-compatibility/2006" xmlns:p14="http://schemas.microsoft.com/office/powerpoint/2010/main">
+    <mc:Choice Requires="p14">
       <p:transition spd="med" p14:dur="700">
         <p:fade/>
       </p:transition>
     </mc:Choice>
-    <mc:Fallback>
+    <mc:Fallback xmlns="">
       <p:transition spd="med">
         <p:fade/>
       </p:transition>
@@ -11317,13 +11317,13 @@
   <p:clrMapOvr>
     <a:masterClrMapping/>
   </p:clrMapOvr>
-  <mc:AlternateContent xmlns:mc="http://schemas.openxmlformats.org/markup-compatibility/2006">
-    <mc:Choice xmlns:p14="http://schemas.microsoft.com/office/powerpoint/2010/main" Requires="p14">
+  <mc:AlternateContent xmlns:mc="http://schemas.openxmlformats.org/markup-compatibility/2006" xmlns:p14="http://schemas.microsoft.com/office/powerpoint/2010/main">
+    <mc:Choice Requires="p14">
       <p:transition spd="med" p14:dur="700">
         <p:fade/>
       </p:transition>
     </mc:Choice>
-    <mc:Fallback>
+    <mc:Fallback xmlns="">
       <p:transition spd="med">
         <p:fade/>
       </p:transition>
@@ -11580,13 +11580,13 @@
   <p:clrMapOvr>
     <a:masterClrMapping/>
   </p:clrMapOvr>
-  <mc:AlternateContent xmlns:mc="http://schemas.openxmlformats.org/markup-compatibility/2006">
-    <mc:Choice xmlns:p14="http://schemas.microsoft.com/office/powerpoint/2010/main" Requires="p14">
+  <mc:AlternateContent xmlns:mc="http://schemas.openxmlformats.org/markup-compatibility/2006" xmlns:p14="http://schemas.microsoft.com/office/powerpoint/2010/main">
+    <mc:Choice Requires="p14">
       <p:transition spd="med" p14:dur="700">
         <p:fade/>
       </p:transition>
     </mc:Choice>
-    <mc:Fallback>
+    <mc:Fallback xmlns="">
       <p:transition spd="med">
         <p:fade/>
       </p:transition>
@@ -11636,13 +11636,13 @@
   <p:clrMapOvr>
     <a:masterClrMapping/>
   </p:clrMapOvr>
-  <mc:AlternateContent xmlns:mc="http://schemas.openxmlformats.org/markup-compatibility/2006">
-    <mc:Choice xmlns:p14="http://schemas.microsoft.com/office/powerpoint/2010/main" Requires="p14">
+  <mc:AlternateContent xmlns:mc="http://schemas.openxmlformats.org/markup-compatibility/2006" xmlns:p14="http://schemas.microsoft.com/office/powerpoint/2010/main">
+    <mc:Choice Requires="p14">
       <p:transition spd="med" p14:dur="700">
         <p:fade/>
       </p:transition>
     </mc:Choice>
-    <mc:Fallback>
+    <mc:Fallback xmlns="">
       <p:transition spd="med">
         <p:fade/>
       </p:transition>
@@ -11802,13 +11802,13 @@
   <p:clrMapOvr>
     <a:masterClrMapping/>
   </p:clrMapOvr>
-  <mc:AlternateContent xmlns:mc="http://schemas.openxmlformats.org/markup-compatibility/2006">
-    <mc:Choice xmlns:p14="http://schemas.microsoft.com/office/powerpoint/2010/main" Requires="p14">
+  <mc:AlternateContent xmlns:mc="http://schemas.openxmlformats.org/markup-compatibility/2006" xmlns:p14="http://schemas.microsoft.com/office/powerpoint/2010/main">
+    <mc:Choice Requires="p14">
       <p:transition spd="med" p14:dur="700">
         <p:fade/>
       </p:transition>
     </mc:Choice>
-    <mc:Fallback>
+    <mc:Fallback xmlns="">
       <p:transition spd="med">
         <p:fade/>
       </p:transition>
@@ -11858,13 +11858,13 @@
   <p:clrMapOvr>
     <a:masterClrMapping/>
   </p:clrMapOvr>
-  <mc:AlternateContent xmlns:mc="http://schemas.openxmlformats.org/markup-compatibility/2006">
-    <mc:Choice xmlns:p14="http://schemas.microsoft.com/office/powerpoint/2010/main" Requires="p14">
+  <mc:AlternateContent xmlns:mc="http://schemas.openxmlformats.org/markup-compatibility/2006" xmlns:p14="http://schemas.microsoft.com/office/powerpoint/2010/main">
+    <mc:Choice Requires="p14">
       <p:transition spd="med" p14:dur="700">
         <p:fade/>
       </p:transition>
     </mc:Choice>
-    <mc:Fallback>
+    <mc:Fallback xmlns="">
       <p:transition spd="med">
         <p:fade/>
       </p:transition>
@@ -12017,13 +12017,13 @@
   <p:clrMapOvr>
     <a:masterClrMapping/>
   </p:clrMapOvr>
-  <mc:AlternateContent xmlns:mc="http://schemas.openxmlformats.org/markup-compatibility/2006">
-    <mc:Choice xmlns:p14="http://schemas.microsoft.com/office/powerpoint/2010/main" Requires="p14">
+  <mc:AlternateContent xmlns:mc="http://schemas.openxmlformats.org/markup-compatibility/2006" xmlns:p14="http://schemas.microsoft.com/office/powerpoint/2010/main">
+    <mc:Choice Requires="p14">
       <p:transition spd="med" p14:dur="700">
         <p:fade/>
       </p:transition>
     </mc:Choice>
-    <mc:Fallback>
+    <mc:Fallback xmlns="">
       <p:transition spd="med">
         <p:fade/>
       </p:transition>
@@ -12083,13 +12083,13 @@
     <p:sldLayoutId id="2147483671" r:id="rId18"/>
     <p:sldLayoutId id="2147483672" r:id="rId19"/>
   </p:sldLayoutIdLst>
-  <mc:AlternateContent xmlns:mc="http://schemas.openxmlformats.org/markup-compatibility/2006">
-    <mc:Choice xmlns:p14="http://schemas.microsoft.com/office/powerpoint/2010/main" Requires="p14">
+  <mc:AlternateContent xmlns:mc="http://schemas.openxmlformats.org/markup-compatibility/2006" xmlns:p14="http://schemas.microsoft.com/office/powerpoint/2010/main">
+    <mc:Choice Requires="p14">
       <p:transition spd="med" p14:dur="700">
         <p:fade/>
       </p:transition>
     </mc:Choice>
-    <mc:Fallback>
+    <mc:Fallback xmlns="">
       <p:transition spd="med">
         <p:fade/>
       </p:transition>
@@ -12412,13 +12412,13 @@
   <p:sldLayoutIdLst>
     <p:sldLayoutId id="2147483674" r:id="rId1"/>
   </p:sldLayoutIdLst>
-  <mc:AlternateContent xmlns:mc="http://schemas.openxmlformats.org/markup-compatibility/2006">
-    <mc:Choice xmlns:p14="http://schemas.microsoft.com/office/powerpoint/2010/main" Requires="p14">
+  <mc:AlternateContent xmlns:mc="http://schemas.openxmlformats.org/markup-compatibility/2006" xmlns:p14="http://schemas.microsoft.com/office/powerpoint/2010/main">
+    <mc:Choice Requires="p14">
       <p:transition spd="med" p14:dur="700">
         <p:fade/>
       </p:transition>
     </mc:Choice>
-    <mc:Fallback>
+    <mc:Fallback xmlns="">
       <p:transition spd="med">
         <p:fade/>
       </p:transition>
@@ -12918,13 +12918,13 @@
   <p:clrMapOvr>
     <a:masterClrMapping/>
   </p:clrMapOvr>
-  <mc:AlternateContent xmlns:mc="http://schemas.openxmlformats.org/markup-compatibility/2006">
-    <mc:Choice xmlns:p14="http://schemas.microsoft.com/office/powerpoint/2010/main" Requires="p14">
+  <mc:AlternateContent xmlns:mc="http://schemas.openxmlformats.org/markup-compatibility/2006" xmlns:p14="http://schemas.microsoft.com/office/powerpoint/2010/main">
+    <mc:Choice Requires="p14">
       <p:transition spd="med" p14:dur="700">
         <p:fade/>
       </p:transition>
     </mc:Choice>
-    <mc:Fallback>
+    <mc:Fallback xmlns="">
       <p:transition spd="med">
         <p:fade/>
       </p:transition>
@@ -13014,13 +13014,13 @@
   <p:clrMapOvr>
     <a:masterClrMapping/>
   </p:clrMapOvr>
-  <mc:AlternateContent xmlns:mc="http://schemas.openxmlformats.org/markup-compatibility/2006">
-    <mc:Choice xmlns:p14="http://schemas.microsoft.com/office/powerpoint/2010/main" Requires="p14">
+  <mc:AlternateContent xmlns:mc="http://schemas.openxmlformats.org/markup-compatibility/2006" xmlns:p14="http://schemas.microsoft.com/office/powerpoint/2010/main">
+    <mc:Choice Requires="p14">
       <p:transition spd="med" p14:dur="700">
         <p:fade/>
       </p:transition>
     </mc:Choice>
-    <mc:Fallback>
+    <mc:Fallback xmlns="">
       <p:transition spd="med">
         <p:fade/>
       </p:transition>
@@ -13572,13 +13572,13 @@
   <p:clrMapOvr>
     <a:masterClrMapping/>
   </p:clrMapOvr>
-  <mc:AlternateContent xmlns:mc="http://schemas.openxmlformats.org/markup-compatibility/2006">
-    <mc:Choice xmlns:p14="http://schemas.microsoft.com/office/powerpoint/2010/main" Requires="p14">
+  <mc:AlternateContent xmlns:mc="http://schemas.openxmlformats.org/markup-compatibility/2006" xmlns:p14="http://schemas.microsoft.com/office/powerpoint/2010/main">
+    <mc:Choice Requires="p14">
       <p:transition spd="med" p14:dur="700">
         <p:fade/>
       </p:transition>
     </mc:Choice>
-    <mc:Fallback>
+    <mc:Fallback xmlns="">
       <p:transition spd="med">
         <p:fade/>
       </p:transition>
@@ -13963,8 +13963,8 @@
           <p:nvPr/>
         </p:nvSpPr>
         <p:spPr>
-          <a:xfrm rot="16200000">
-            <a:off x="683147" y="4880831"/>
+          <a:xfrm>
+            <a:off x="728523" y="4194674"/>
             <a:ext cx="1484856" cy="434924"/>
           </a:xfrm>
           <a:prstGeom prst="roundRect">
@@ -14025,8 +14025,8 @@
           <p:nvPr/>
         </p:nvSpPr>
         <p:spPr bwMode="auto">
-          <a:xfrm rot="16200000">
-            <a:off x="819708" y="4898238"/>
+          <a:xfrm>
+            <a:off x="865084" y="4212081"/>
             <a:ext cx="1204290" cy="400110"/>
           </a:xfrm>
           <a:prstGeom prst="rect">
@@ -14178,7 +14178,7 @@
         </p:nvSpPr>
         <p:spPr>
           <a:xfrm>
-            <a:off x="1703717" y="4421184"/>
+            <a:off x="547490" y="4771743"/>
             <a:ext cx="2691170" cy="523220"/>
           </a:xfrm>
           <a:prstGeom prst="rect">
@@ -14229,8 +14229,8 @@
           <p:nvPr/>
         </p:nvSpPr>
         <p:spPr>
-          <a:xfrm rot="16200000">
-            <a:off x="2405822" y="2546284"/>
+          <a:xfrm>
+            <a:off x="2459610" y="3211111"/>
             <a:ext cx="1484856" cy="434924"/>
           </a:xfrm>
           <a:prstGeom prst="roundRect">
@@ -14291,8 +14291,8 @@
           <p:nvPr/>
         </p:nvSpPr>
         <p:spPr bwMode="auto">
-          <a:xfrm rot="16200000">
-            <a:off x="2542383" y="2563691"/>
+          <a:xfrm>
+            <a:off x="2596171" y="3228518"/>
             <a:ext cx="1204290" cy="400110"/>
           </a:xfrm>
           <a:prstGeom prst="rect">
@@ -14444,7 +14444,7 @@
         </p:nvSpPr>
         <p:spPr>
           <a:xfrm>
-            <a:off x="3473637" y="2025081"/>
+            <a:off x="2327832" y="2382317"/>
             <a:ext cx="2500484" cy="738664"/>
           </a:xfrm>
           <a:prstGeom prst="rect">
@@ -14495,8 +14495,8 @@
           <p:nvPr/>
         </p:nvSpPr>
         <p:spPr>
-          <a:xfrm rot="16200000">
-            <a:off x="4187530" y="4610000"/>
+          <a:xfrm>
+            <a:off x="4159535" y="4141305"/>
             <a:ext cx="1484856" cy="976585"/>
           </a:xfrm>
           <a:prstGeom prst="roundRect">
@@ -14557,9 +14557,9 @@
           <p:nvPr/>
         </p:nvSpPr>
         <p:spPr bwMode="auto">
-          <a:xfrm rot="16200000">
-            <a:off x="4327813" y="4590461"/>
-            <a:ext cx="1204290" cy="1015663"/>
+          <a:xfrm>
+            <a:off x="4299817" y="4275654"/>
+            <a:ext cx="1269735" cy="707886"/>
           </a:xfrm>
           <a:prstGeom prst="rect">
             <a:avLst/>
@@ -14710,7 +14710,7 @@
         </p:nvSpPr>
         <p:spPr>
           <a:xfrm>
-            <a:off x="5504108" y="4301871"/>
+            <a:off x="4058787" y="5206666"/>
             <a:ext cx="2106927" cy="954107"/>
           </a:xfrm>
           <a:prstGeom prst="rect">
@@ -14817,8 +14817,8 @@
           <p:nvPr/>
         </p:nvSpPr>
         <p:spPr>
-          <a:xfrm rot="16200000">
-            <a:off x="5847450" y="2262891"/>
+          <a:xfrm>
+            <a:off x="5854085" y="2641020"/>
             <a:ext cx="1484856" cy="1001710"/>
           </a:xfrm>
           <a:prstGeom prst="roundRect">
@@ -14879,8 +14879,8 @@
           <p:nvPr/>
         </p:nvSpPr>
         <p:spPr bwMode="auto">
-          <a:xfrm rot="16200000">
-            <a:off x="5987733" y="2255914"/>
+          <a:xfrm>
+            <a:off x="5994368" y="2634043"/>
             <a:ext cx="1204290" cy="1015663"/>
           </a:xfrm>
           <a:prstGeom prst="rect">
@@ -15032,7 +15032,7 @@
         </p:nvSpPr>
         <p:spPr>
           <a:xfrm>
-            <a:off x="7198658" y="2025081"/>
+            <a:off x="7363686" y="2710459"/>
             <a:ext cx="2615385" cy="738664"/>
           </a:xfrm>
           <a:prstGeom prst="rect">
@@ -15083,8 +15083,8 @@
           <p:nvPr/>
         </p:nvSpPr>
         <p:spPr>
-          <a:xfrm rot="16200000">
-            <a:off x="7609205" y="4590461"/>
+          <a:xfrm>
+            <a:off x="7608769" y="4141305"/>
             <a:ext cx="1484856" cy="1015663"/>
           </a:xfrm>
           <a:prstGeom prst="roundRect">
@@ -15145,8 +15145,8 @@
           <p:nvPr/>
         </p:nvSpPr>
         <p:spPr bwMode="auto">
-          <a:xfrm rot="16200000">
-            <a:off x="7749488" y="4590461"/>
+          <a:xfrm>
+            <a:off x="7749052" y="4141305"/>
             <a:ext cx="1204290" cy="1015663"/>
           </a:xfrm>
           <a:prstGeom prst="rect">
@@ -15313,7 +15313,7 @@
         </p:nvSpPr>
         <p:spPr>
           <a:xfrm>
-            <a:off x="9000565" y="4301872"/>
+            <a:off x="8312553" y="5245744"/>
             <a:ext cx="2106927" cy="954107"/>
           </a:xfrm>
           <a:prstGeom prst="rect">
@@ -15429,13 +15429,13 @@
   <p:clrMapOvr>
     <a:masterClrMapping/>
   </p:clrMapOvr>
-  <mc:AlternateContent xmlns:mc="http://schemas.openxmlformats.org/markup-compatibility/2006">
-    <mc:Choice xmlns:p14="http://schemas.microsoft.com/office/powerpoint/2010/main" Requires="p14">
+  <mc:AlternateContent xmlns:mc="http://schemas.openxmlformats.org/markup-compatibility/2006" xmlns:p14="http://schemas.microsoft.com/office/powerpoint/2010/main">
+    <mc:Choice Requires="p14">
       <p:transition spd="med" p14:dur="700">
         <p:fade/>
       </p:transition>
     </mc:Choice>
-    <mc:Fallback>
+    <mc:Fallback xmlns="">
       <p:transition spd="med">
         <p:fade/>
       </p:transition>
@@ -17256,13 +17256,13 @@
   <p:clrMapOvr>
     <a:masterClrMapping/>
   </p:clrMapOvr>
-  <mc:AlternateContent xmlns:mc="http://schemas.openxmlformats.org/markup-compatibility/2006">
-    <mc:Choice xmlns:p14="http://schemas.microsoft.com/office/powerpoint/2010/main" Requires="p14">
+  <mc:AlternateContent xmlns:mc="http://schemas.openxmlformats.org/markup-compatibility/2006" xmlns:p14="http://schemas.microsoft.com/office/powerpoint/2010/main">
+    <mc:Choice Requires="p14">
       <p:transition spd="med" p14:dur="700">
         <p:fade/>
       </p:transition>
     </mc:Choice>
-    <mc:Fallback>
+    <mc:Fallback xmlns="">
       <p:transition spd="med">
         <p:fade/>
       </p:transition>
@@ -20096,13 +20096,13 @@
   <p:clrMapOvr>
     <a:masterClrMapping/>
   </p:clrMapOvr>
-  <mc:AlternateContent xmlns:mc="http://schemas.openxmlformats.org/markup-compatibility/2006">
-    <mc:Choice xmlns:p14="http://schemas.microsoft.com/office/powerpoint/2010/main" Requires="p14">
+  <mc:AlternateContent xmlns:mc="http://schemas.openxmlformats.org/markup-compatibility/2006" xmlns:p14="http://schemas.microsoft.com/office/powerpoint/2010/main">
+    <mc:Choice Requires="p14">
       <p:transition spd="med" p14:dur="700">
         <p:fade/>
       </p:transition>
     </mc:Choice>
-    <mc:Fallback>
+    <mc:Fallback xmlns="">
       <p:transition spd="med">
         <p:fade/>
       </p:transition>
@@ -22190,13 +22190,13 @@
   <p:clrMapOvr>
     <a:masterClrMapping/>
   </p:clrMapOvr>
-  <mc:AlternateContent xmlns:mc="http://schemas.openxmlformats.org/markup-compatibility/2006">
-    <mc:Choice xmlns:p14="http://schemas.microsoft.com/office/powerpoint/2010/main" Requires="p14">
+  <mc:AlternateContent xmlns:mc="http://schemas.openxmlformats.org/markup-compatibility/2006" xmlns:p14="http://schemas.microsoft.com/office/powerpoint/2010/main">
+    <mc:Choice Requires="p14">
       <p:transition spd="med" p14:dur="700">
         <p:fade/>
       </p:transition>
     </mc:Choice>
-    <mc:Fallback>
+    <mc:Fallback xmlns="">
       <p:transition spd="med">
         <p:fade/>
       </p:transition>
@@ -29074,13 +29074,13 @@
   <p:clrMapOvr>
     <a:masterClrMapping/>
   </p:clrMapOvr>
-  <mc:AlternateContent xmlns:mc="http://schemas.openxmlformats.org/markup-compatibility/2006">
-    <mc:Choice xmlns:p14="http://schemas.microsoft.com/office/powerpoint/2010/main" Requires="p14">
+  <mc:AlternateContent xmlns:mc="http://schemas.openxmlformats.org/markup-compatibility/2006" xmlns:p14="http://schemas.microsoft.com/office/powerpoint/2010/main">
+    <mc:Choice Requires="p14">
       <p:transition spd="med" p14:dur="700">
         <p:fade/>
       </p:transition>
     </mc:Choice>
-    <mc:Fallback>
+    <mc:Fallback xmlns="">
       <p:transition spd="med">
         <p:fade/>
       </p:transition>
@@ -29800,13 +29800,13 @@
   <p:clrMapOvr>
     <a:masterClrMapping/>
   </p:clrMapOvr>
-  <mc:AlternateContent xmlns:mc="http://schemas.openxmlformats.org/markup-compatibility/2006">
-    <mc:Choice xmlns:p14="http://schemas.microsoft.com/office/powerpoint/2010/main" Requires="p14">
+  <mc:AlternateContent xmlns:mc="http://schemas.openxmlformats.org/markup-compatibility/2006" xmlns:p14="http://schemas.microsoft.com/office/powerpoint/2010/main">
+    <mc:Choice Requires="p14">
       <p:transition spd="med" p14:dur="700">
         <p:fade/>
       </p:transition>
     </mc:Choice>
-    <mc:Fallback>
+    <mc:Fallback xmlns="">
       <p:transition spd="med">
         <p:fade/>
       </p:transition>
@@ -31879,13 +31879,13 @@
   <p:clrMapOvr>
     <a:masterClrMapping/>
   </p:clrMapOvr>
-  <mc:AlternateContent xmlns:mc="http://schemas.openxmlformats.org/markup-compatibility/2006">
-    <mc:Choice xmlns:p14="http://schemas.microsoft.com/office/powerpoint/2010/main" Requires="p14">
+  <mc:AlternateContent xmlns:mc="http://schemas.openxmlformats.org/markup-compatibility/2006" xmlns:p14="http://schemas.microsoft.com/office/powerpoint/2010/main">
+    <mc:Choice Requires="p14">
       <p:transition spd="med" p14:dur="700">
         <p:fade/>
       </p:transition>
     </mc:Choice>
-    <mc:Fallback>
+    <mc:Fallback xmlns="">
       <p:transition spd="med">
         <p:fade/>
       </p:transition>

</xml_diff>